<commit_message>
5th day of powershell programming
</commit_message>
<xml_diff>
--- a/Windows Powershell-basics.pptx
+++ b/Windows Powershell-basics.pptx
@@ -34,6 +34,7 @@
     <p:sldId id="292" r:id="rId28"/>
     <p:sldId id="293" r:id="rId29"/>
     <p:sldId id="294" r:id="rId30"/>
+    <p:sldId id="301" r:id="rId31"/>
   </p:sldIdLst>
   <p:sldSz cx="12192000" cy="6858000"/>
   <p:notesSz cx="6858000" cy="9144000"/>
@@ -289,7 +290,7 @@
           <a:p>
             <a:fld id="{8B8CBDFF-462B-47C4-B2D0-FA7D35DAFB29}" type="datetimeFigureOut">
               <a:rPr lang="en-IN" smtClean="0"/>
-              <a:t>06-10-2022</a:t>
+              <a:t>07-10-2022</a:t>
             </a:fld>
             <a:endParaRPr lang="en-IN"/>
           </a:p>
@@ -489,7 +490,7 @@
           <a:p>
             <a:fld id="{8B8CBDFF-462B-47C4-B2D0-FA7D35DAFB29}" type="datetimeFigureOut">
               <a:rPr lang="en-IN" smtClean="0"/>
-              <a:t>06-10-2022</a:t>
+              <a:t>07-10-2022</a:t>
             </a:fld>
             <a:endParaRPr lang="en-IN"/>
           </a:p>
@@ -699,7 +700,7 @@
           <a:p>
             <a:fld id="{8B8CBDFF-462B-47C4-B2D0-FA7D35DAFB29}" type="datetimeFigureOut">
               <a:rPr lang="en-IN" smtClean="0"/>
-              <a:t>06-10-2022</a:t>
+              <a:t>07-10-2022</a:t>
             </a:fld>
             <a:endParaRPr lang="en-IN"/>
           </a:p>
@@ -899,7 +900,7 @@
           <a:p>
             <a:fld id="{8B8CBDFF-462B-47C4-B2D0-FA7D35DAFB29}" type="datetimeFigureOut">
               <a:rPr lang="en-IN" smtClean="0"/>
-              <a:t>06-10-2022</a:t>
+              <a:t>07-10-2022</a:t>
             </a:fld>
             <a:endParaRPr lang="en-IN"/>
           </a:p>
@@ -1175,7 +1176,7 @@
           <a:p>
             <a:fld id="{8B8CBDFF-462B-47C4-B2D0-FA7D35DAFB29}" type="datetimeFigureOut">
               <a:rPr lang="en-IN" smtClean="0"/>
-              <a:t>06-10-2022</a:t>
+              <a:t>07-10-2022</a:t>
             </a:fld>
             <a:endParaRPr lang="en-IN"/>
           </a:p>
@@ -1443,7 +1444,7 @@
           <a:p>
             <a:fld id="{8B8CBDFF-462B-47C4-B2D0-FA7D35DAFB29}" type="datetimeFigureOut">
               <a:rPr lang="en-IN" smtClean="0"/>
-              <a:t>06-10-2022</a:t>
+              <a:t>07-10-2022</a:t>
             </a:fld>
             <a:endParaRPr lang="en-IN"/>
           </a:p>
@@ -1858,7 +1859,7 @@
           <a:p>
             <a:fld id="{8B8CBDFF-462B-47C4-B2D0-FA7D35DAFB29}" type="datetimeFigureOut">
               <a:rPr lang="en-IN" smtClean="0"/>
-              <a:t>06-10-2022</a:t>
+              <a:t>07-10-2022</a:t>
             </a:fld>
             <a:endParaRPr lang="en-IN"/>
           </a:p>
@@ -2000,7 +2001,7 @@
           <a:p>
             <a:fld id="{8B8CBDFF-462B-47C4-B2D0-FA7D35DAFB29}" type="datetimeFigureOut">
               <a:rPr lang="en-IN" smtClean="0"/>
-              <a:t>06-10-2022</a:t>
+              <a:t>07-10-2022</a:t>
             </a:fld>
             <a:endParaRPr lang="en-IN"/>
           </a:p>
@@ -2113,7 +2114,7 @@
           <a:p>
             <a:fld id="{8B8CBDFF-462B-47C4-B2D0-FA7D35DAFB29}" type="datetimeFigureOut">
               <a:rPr lang="en-IN" smtClean="0"/>
-              <a:t>06-10-2022</a:t>
+              <a:t>07-10-2022</a:t>
             </a:fld>
             <a:endParaRPr lang="en-IN"/>
           </a:p>
@@ -2426,7 +2427,7 @@
           <a:p>
             <a:fld id="{8B8CBDFF-462B-47C4-B2D0-FA7D35DAFB29}" type="datetimeFigureOut">
               <a:rPr lang="en-IN" smtClean="0"/>
-              <a:t>06-10-2022</a:t>
+              <a:t>07-10-2022</a:t>
             </a:fld>
             <a:endParaRPr lang="en-IN"/>
           </a:p>
@@ -2715,7 +2716,7 @@
           <a:p>
             <a:fld id="{8B8CBDFF-462B-47C4-B2D0-FA7D35DAFB29}" type="datetimeFigureOut">
               <a:rPr lang="en-IN" smtClean="0"/>
-              <a:t>06-10-2022</a:t>
+              <a:t>07-10-2022</a:t>
             </a:fld>
             <a:endParaRPr lang="en-IN"/>
           </a:p>
@@ -2958,7 +2959,7 @@
           <a:p>
             <a:fld id="{8B8CBDFF-462B-47C4-B2D0-FA7D35DAFB29}" type="datetimeFigureOut">
               <a:rPr lang="en-IN" smtClean="0"/>
-              <a:t>06-10-2022</a:t>
+              <a:t>07-10-2022</a:t>
             </a:fld>
             <a:endParaRPr lang="en-IN"/>
           </a:p>
@@ -12286,6 +12287,90 @@
     <p:extLst>
       <p:ext uri="{BB962C8B-B14F-4D97-AF65-F5344CB8AC3E}">
         <p14:creationId xmlns:p14="http://schemas.microsoft.com/office/powerpoint/2010/main" val="4043830537"/>
+      </p:ext>
+    </p:extLst>
+  </p:cSld>
+  <p:clrMapOvr>
+    <a:masterClrMapping/>
+  </p:clrMapOvr>
+</p:sld>
+</file>
+
+<file path=ppt/slides/slide30.xml><?xml version="1.0" encoding="utf-8"?>
+<p:sld xmlns:a="http://schemas.openxmlformats.org/drawingml/2006/main" xmlns:r="http://schemas.openxmlformats.org/officeDocument/2006/relationships" xmlns:p="http://schemas.openxmlformats.org/presentationml/2006/main">
+  <p:cSld>
+    <p:spTree>
+      <p:nvGrpSpPr>
+        <p:cNvPr id="1" name=""/>
+        <p:cNvGrpSpPr/>
+        <p:nvPr/>
+      </p:nvGrpSpPr>
+      <p:grpSpPr>
+        <a:xfrm>
+          <a:off x="0" y="0"/>
+          <a:ext cx="0" cy="0"/>
+          <a:chOff x="0" y="0"/>
+          <a:chExt cx="0" cy="0"/>
+        </a:xfrm>
+      </p:grpSpPr>
+      <p:sp>
+        <p:nvSpPr>
+          <p:cNvPr id="2" name="Title 1">
+            <a:extLst>
+              <a:ext uri="{FF2B5EF4-FFF2-40B4-BE49-F238E27FC236}">
+                <a16:creationId xmlns:a16="http://schemas.microsoft.com/office/drawing/2014/main" id="{A5167A45-3E16-4A41-EB97-C2CB5649B8EA}"/>
+              </a:ext>
+            </a:extLst>
+          </p:cNvPr>
+          <p:cNvSpPr>
+            <a:spLocks noGrp="1"/>
+          </p:cNvSpPr>
+          <p:nvPr>
+            <p:ph type="title"/>
+          </p:nvPr>
+        </p:nvSpPr>
+        <p:spPr/>
+        <p:txBody>
+          <a:bodyPr/>
+          <a:lstStyle/>
+          <a:p>
+            <a:endParaRPr lang="en-IN"/>
+          </a:p>
+        </p:txBody>
+      </p:sp>
+      <p:pic>
+        <p:nvPicPr>
+          <p:cNvPr id="5" name="Content Placeholder 4">
+            <a:extLst>
+              <a:ext uri="{FF2B5EF4-FFF2-40B4-BE49-F238E27FC236}">
+                <a16:creationId xmlns:a16="http://schemas.microsoft.com/office/drawing/2014/main" id="{EB960482-3810-C8CF-4654-2E7591348EEA}"/>
+              </a:ext>
+            </a:extLst>
+          </p:cNvPr>
+          <p:cNvPicPr>
+            <a:picLocks noGrp="1" noChangeAspect="1"/>
+          </p:cNvPicPr>
+          <p:nvPr>
+            <p:ph idx="1"/>
+          </p:nvPr>
+        </p:nvPicPr>
+        <p:blipFill>
+          <a:blip r:embed="rId2"/>
+          <a:stretch>
+            <a:fillRect/>
+          </a:stretch>
+        </p:blipFill>
+        <p:spPr>
+          <a:xfrm>
+            <a:off x="3727276" y="1825625"/>
+            <a:ext cx="4737448" cy="4351338"/>
+          </a:xfrm>
+        </p:spPr>
+      </p:pic>
+    </p:spTree>
+    <p:extLst>
+      <p:ext uri="{BB962C8B-B14F-4D97-AF65-F5344CB8AC3E}">
+        <p14:creationId xmlns:p14="http://schemas.microsoft.com/office/powerpoint/2010/main" val="2476910341"/>
       </p:ext>
     </p:extLst>
   </p:cSld>

</xml_diff>